<commit_message>
finalized lesson for 09/05/2023
</commit_message>
<xml_diff>
--- a/06 statistiek/04 Numerieke data verdelingen verkennen/04 Numerieke data verdelingen verkennen.pptx
+++ b/06 statistiek/04 Numerieke data verdelingen verkennen/04 Numerieke data verdelingen verkennen.pptx
@@ -500,7 +500,7 @@
           <a:p>
             <a:fld id="{A21F7CDD-23CF-5441-8EE8-3A82C7512332}" type="datetimeFigureOut">
               <a:rPr lang="nl-NL" smtClean="0"/>
-              <a:t>29-4-2023</a:t>
+              <a:t>4-5-2023</a:t>
             </a:fld>
             <a:endParaRPr lang="nl-NL"/>
           </a:p>
@@ -1812,7 +1812,7 @@
           <a:p>
             <a:fld id="{27A546E8-399A-4DE2-8C60-36B2FE674090}" type="datetime2">
               <a:rPr lang="en-GB" noProof="0" smtClean="0"/>
-              <a:t>Saturday, 29 April 2023</a:t>
+              <a:t>Thursday, 04 May 2023</a:t>
             </a:fld>
             <a:endParaRPr lang="en-GB" noProof="0" dirty="0"/>
           </a:p>
@@ -6709,7 +6709,7 @@
           <a:p>
             <a:fld id="{AA22FCD4-EEE5-4A16-9ED2-37516E7989C8}" type="datetime2">
               <a:rPr lang="en-GB" noProof="0" smtClean="0"/>
-              <a:t>Saturday, 29 April 2023</a:t>
+              <a:t>Thursday, 04 May 2023</a:t>
             </a:fld>
             <a:endParaRPr lang="en-GB" noProof="0" dirty="0"/>
           </a:p>
@@ -14058,7 +14058,7 @@
           <a:p>
             <a:fld id="{F5C00587-4368-4D98-88C9-D75DCD2961D4}" type="datetime2">
               <a:rPr lang="en-GB" noProof="0" smtClean="0"/>
-              <a:t>Saturday, 29 April 2023</a:t>
+              <a:t>Thursday, 04 May 2023</a:t>
             </a:fld>
             <a:endParaRPr lang="en-GB" noProof="0" dirty="0"/>
           </a:p>
@@ -17360,6 +17360,57 @@
           </a:p>
         </p:txBody>
       </p:sp>
+      <p:sp>
+        <p:nvSpPr>
+          <p:cNvPr id="4" name="TextBox 3">
+            <a:extLst>
+              <a:ext uri="{FF2B5EF4-FFF2-40B4-BE49-F238E27FC236}">
+                <a16:creationId xmlns:a16="http://schemas.microsoft.com/office/drawing/2014/main" id="{8E3C100B-CD52-0804-435D-19F5A563A32C}"/>
+              </a:ext>
+            </a:extLst>
+          </p:cNvPr>
+          <p:cNvSpPr txBox="1"/>
+          <p:nvPr/>
+        </p:nvSpPr>
+        <p:spPr>
+          <a:xfrm>
+            <a:off x="3667874" y="6256962"/>
+            <a:ext cx="6729573" cy="369332"/>
+          </a:xfrm>
+          <a:prstGeom prst="rect">
+            <a:avLst/>
+          </a:prstGeom>
+          <a:noFill/>
+        </p:spPr>
+        <p:txBody>
+          <a:bodyPr wrap="square" rtlCol="0">
+            <a:spAutoFit/>
+          </a:bodyPr>
+          <a:lstStyle/>
+          <a:p>
+            <a:r>
+              <a:rPr lang="en-GB" b="1" dirty="0" err="1"/>
+              <a:t>Zie</a:t>
+            </a:r>
+            <a:r>
+              <a:rPr lang="en-GB" b="1" dirty="0"/>
+              <a:t> </a:t>
+            </a:r>
+            <a:r>
+              <a:rPr lang="en-GB" b="1" dirty="0" err="1"/>
+              <a:t>ook</a:t>
+            </a:r>
+            <a:r>
+              <a:rPr lang="en-GB" b="1" dirty="0"/>
+              <a:t>:</a:t>
+            </a:r>
+            <a:r>
+              <a:rPr lang="en-GB" dirty="0"/>
+              <a:t> https://www.youtube.com/watch?v=ZA4JkHKZM50&amp;t=216s</a:t>
+            </a:r>
+          </a:p>
+        </p:txBody>
+      </p:sp>
     </p:spTree>
     <p:extLst>
       <p:ext uri="{BB962C8B-B14F-4D97-AF65-F5344CB8AC3E}">
@@ -18082,8 +18133,8 @@
           </a:p>
         </p:txBody>
       </p:sp>
-      <mc:AlternateContent xmlns:mc="http://schemas.openxmlformats.org/markup-compatibility/2006">
-        <mc:Choice xmlns:a14="http://schemas.microsoft.com/office/drawing/2010/main" Requires="a14">
+      <mc:AlternateContent xmlns:mc="http://schemas.openxmlformats.org/markup-compatibility/2006" xmlns:a14="http://schemas.microsoft.com/office/drawing/2010/main">
+        <mc:Choice Requires="a14">
           <p:sp>
             <p:nvSpPr>
               <p:cNvPr id="3" name="Content Placeholder 2">
@@ -18462,7 +18513,7 @@
             </p:txBody>
           </p:sp>
         </mc:Choice>
-        <mc:Fallback>
+        <mc:Fallback xmlns="">
           <p:sp>
             <p:nvSpPr>
               <p:cNvPr id="3" name="Content Placeholder 2">
@@ -21852,8 +21903,8 @@
           </a:p>
         </p:txBody>
       </p:sp>
-      <mc:AlternateContent xmlns:mc="http://schemas.openxmlformats.org/markup-compatibility/2006">
-        <mc:Choice xmlns:a14="http://schemas.microsoft.com/office/drawing/2010/main" Requires="a14">
+      <mc:AlternateContent xmlns:mc="http://schemas.openxmlformats.org/markup-compatibility/2006" xmlns:a14="http://schemas.microsoft.com/office/drawing/2010/main">
+        <mc:Choice Requires="a14">
           <p:sp>
             <p:nvSpPr>
               <p:cNvPr id="3" name="Content Placeholder 2">
@@ -22593,7 +22644,7 @@
             </p:txBody>
           </p:sp>
         </mc:Choice>
-        <mc:Fallback>
+        <mc:Fallback xmlns="">
           <p:sp>
             <p:nvSpPr>
               <p:cNvPr id="3" name="Content Placeholder 2">
@@ -22793,8 +22844,8 @@
           </a:p>
         </p:txBody>
       </p:sp>
-      <mc:AlternateContent xmlns:mc="http://schemas.openxmlformats.org/markup-compatibility/2006">
-        <mc:Choice xmlns:a14="http://schemas.microsoft.com/office/drawing/2010/main" Requires="a14">
+      <mc:AlternateContent xmlns:mc="http://schemas.openxmlformats.org/markup-compatibility/2006" xmlns:a14="http://schemas.microsoft.com/office/drawing/2010/main">
+        <mc:Choice Requires="a14">
           <p:sp>
             <p:nvSpPr>
               <p:cNvPr id="3" name="Content Placeholder 2">
@@ -23114,7 +23165,7 @@
             </p:txBody>
           </p:sp>
         </mc:Choice>
-        <mc:Fallback>
+        <mc:Fallback xmlns="">
           <p:sp>
             <p:nvSpPr>
               <p:cNvPr id="3" name="Content Placeholder 2">
@@ -23201,8 +23252,8 @@
           </a:extLst>
         </p:spPr>
       </p:pic>
-      <mc:AlternateContent xmlns:mc="http://schemas.openxmlformats.org/markup-compatibility/2006">
-        <mc:Choice xmlns:a14="http://schemas.microsoft.com/office/drawing/2010/main" Requires="a14">
+      <mc:AlternateContent xmlns:mc="http://schemas.openxmlformats.org/markup-compatibility/2006" xmlns:a14="http://schemas.microsoft.com/office/drawing/2010/main">
+        <mc:Choice Requires="a14">
           <p:sp>
             <p:nvSpPr>
               <p:cNvPr id="5" name="TextBox 4">
@@ -23264,7 +23315,7 @@
             </p:txBody>
           </p:sp>
         </mc:Choice>
-        <mc:Fallback>
+        <mc:Fallback xmlns="">
           <p:sp>
             <p:nvSpPr>
               <p:cNvPr id="5" name="TextBox 4">
@@ -23309,8 +23360,8 @@
           </p:sp>
         </mc:Fallback>
       </mc:AlternateContent>
-      <mc:AlternateContent xmlns:mc="http://schemas.openxmlformats.org/markup-compatibility/2006">
-        <mc:Choice xmlns:a14="http://schemas.microsoft.com/office/drawing/2010/main" Requires="a14">
+      <mc:AlternateContent xmlns:mc="http://schemas.openxmlformats.org/markup-compatibility/2006" xmlns:a14="http://schemas.microsoft.com/office/drawing/2010/main">
+        <mc:Choice Requires="a14">
           <p:sp>
             <p:nvSpPr>
               <p:cNvPr id="6" name="TextBox 5">
@@ -23391,7 +23442,7 @@
             </p:txBody>
           </p:sp>
         </mc:Choice>
-        <mc:Fallback>
+        <mc:Fallback xmlns="">
           <p:sp>
             <p:nvSpPr>
               <p:cNvPr id="6" name="TextBox 5">
@@ -23436,8 +23487,8 @@
           </p:sp>
         </mc:Fallback>
       </mc:AlternateContent>
-      <mc:AlternateContent xmlns:mc="http://schemas.openxmlformats.org/markup-compatibility/2006">
-        <mc:Choice xmlns:a14="http://schemas.microsoft.com/office/drawing/2010/main" Requires="a14">
+      <mc:AlternateContent xmlns:mc="http://schemas.openxmlformats.org/markup-compatibility/2006" xmlns:a14="http://schemas.microsoft.com/office/drawing/2010/main">
+        <mc:Choice Requires="a14">
           <p:sp>
             <p:nvSpPr>
               <p:cNvPr id="7" name="TextBox 6">
@@ -23499,7 +23550,7 @@
             </p:txBody>
           </p:sp>
         </mc:Choice>
-        <mc:Fallback>
+        <mc:Fallback xmlns="">
           <p:sp>
             <p:nvSpPr>
               <p:cNvPr id="7" name="TextBox 6">
@@ -23544,8 +23595,8 @@
           </p:sp>
         </mc:Fallback>
       </mc:AlternateContent>
-      <mc:AlternateContent xmlns:mc="http://schemas.openxmlformats.org/markup-compatibility/2006">
-        <mc:Choice xmlns:a14="http://schemas.microsoft.com/office/drawing/2010/main" Requires="a14">
+      <mc:AlternateContent xmlns:mc="http://schemas.openxmlformats.org/markup-compatibility/2006" xmlns:a14="http://schemas.microsoft.com/office/drawing/2010/main">
+        <mc:Choice Requires="a14">
           <p:sp>
             <p:nvSpPr>
               <p:cNvPr id="8" name="TextBox 7">
@@ -23626,7 +23677,7 @@
             </p:txBody>
           </p:sp>
         </mc:Choice>
-        <mc:Fallback>
+        <mc:Fallback xmlns="">
           <p:sp>
             <p:nvSpPr>
               <p:cNvPr id="8" name="TextBox 7">
@@ -23671,8 +23722,8 @@
           </p:sp>
         </mc:Fallback>
       </mc:AlternateContent>
-      <mc:AlternateContent xmlns:mc="http://schemas.openxmlformats.org/markup-compatibility/2006">
-        <mc:Choice xmlns:a14="http://schemas.microsoft.com/office/drawing/2010/main" Requires="a14">
+      <mc:AlternateContent xmlns:mc="http://schemas.openxmlformats.org/markup-compatibility/2006" xmlns:a14="http://schemas.microsoft.com/office/drawing/2010/main">
+        <mc:Choice Requires="a14">
           <p:sp>
             <p:nvSpPr>
               <p:cNvPr id="9" name="TextBox 8">
@@ -23753,7 +23804,7 @@
             </p:txBody>
           </p:sp>
         </mc:Choice>
-        <mc:Fallback>
+        <mc:Fallback xmlns="">
           <p:sp>
             <p:nvSpPr>
               <p:cNvPr id="9" name="TextBox 8">
@@ -23798,8 +23849,8 @@
           </p:sp>
         </mc:Fallback>
       </mc:AlternateContent>
-      <mc:AlternateContent xmlns:mc="http://schemas.openxmlformats.org/markup-compatibility/2006">
-        <mc:Choice xmlns:a14="http://schemas.microsoft.com/office/drawing/2010/main" Requires="a14">
+      <mc:AlternateContent xmlns:mc="http://schemas.openxmlformats.org/markup-compatibility/2006" xmlns:a14="http://schemas.microsoft.com/office/drawing/2010/main">
+        <mc:Choice Requires="a14">
           <p:sp>
             <p:nvSpPr>
               <p:cNvPr id="10" name="TextBox 9">
@@ -23861,7 +23912,7 @@
             </p:txBody>
           </p:sp>
         </mc:Choice>
-        <mc:Fallback>
+        <mc:Fallback xmlns="">
           <p:sp>
             <p:nvSpPr>
               <p:cNvPr id="10" name="TextBox 9">
@@ -30026,8 +30077,8 @@
           </a:p>
         </p:txBody>
       </p:sp>
-      <mc:AlternateContent xmlns:mc="http://schemas.openxmlformats.org/markup-compatibility/2006">
-        <mc:Choice xmlns:a14="http://schemas.microsoft.com/office/drawing/2010/main" Requires="a14">
+      <mc:AlternateContent xmlns:mc="http://schemas.openxmlformats.org/markup-compatibility/2006" xmlns:a14="http://schemas.microsoft.com/office/drawing/2010/main">
+        <mc:Choice Requires="a14">
           <p:sp>
             <p:nvSpPr>
               <p:cNvPr id="3" name="Content Placeholder 2">
@@ -30402,7 +30453,7 @@
             </p:txBody>
           </p:sp>
         </mc:Choice>
-        <mc:Fallback>
+        <mc:Fallback xmlns="">
           <p:sp>
             <p:nvSpPr>
               <p:cNvPr id="3" name="Content Placeholder 2">
@@ -36317,21 +36368,6 @@
 </file>
 
 <file path=customXml/item1.xml><?xml version="1.0" encoding="utf-8"?>
-<p:properties xmlns:p="http://schemas.microsoft.com/office/2006/metadata/properties" xmlns:xsi="http://www.w3.org/2001/XMLSchema-instance" xmlns:pc="http://schemas.microsoft.com/office/infopath/2007/PartnerControls">
-  <documentManagement/>
-</p:properties>
-</file>
-
-<file path=customXml/item2.xml><?xml version="1.0" encoding="utf-8"?>
-<?mso-contentType ?>
-<FormTemplates xmlns="http://schemas.microsoft.com/sharepoint/v3/contenttype/forms">
-  <Display>DocumentLibraryForm</Display>
-  <Edit>DocumentLibraryForm</Edit>
-  <New>DocumentLibraryForm</New>
-</FormTemplates>
-</file>
-
-<file path=customXml/item3.xml><?xml version="1.0" encoding="utf-8"?>
 <ct:contentTypeSchema xmlns:ct="http://schemas.microsoft.com/office/2006/metadata/contentType" xmlns:ma="http://schemas.microsoft.com/office/2006/metadata/properties/metaAttributes" ct:_="" ma:_="" ma:contentTypeName="Document" ma:contentTypeID="0x0101000198679BBEF31544BF1C5E94380D134B" ma:contentTypeVersion="11" ma:contentTypeDescription="Een nieuw document maken." ma:contentTypeScope="" ma:versionID="928c7503a392f8c19ded68dda1121e60">
   <xsd:schema xmlns:xsd="http://www.w3.org/2001/XMLSchema" xmlns:xs="http://www.w3.org/2001/XMLSchema" xmlns:p="http://schemas.microsoft.com/office/2006/metadata/properties" xmlns:ns2="e60f335d-e4bd-4666-890a-892f5e8cff2d" xmlns:ns3="d5f8be41-0169-49b5-b686-d4287d5aac73" targetNamespace="http://schemas.microsoft.com/office/2006/metadata/properties" ma:root="true" ma:fieldsID="8f91e335dd6c64b6d30237bdd58663b1" ns2:_="" ns3:_="">
     <xsd:import namespace="e60f335d-e4bd-4666-890a-892f5e8cff2d"/>
@@ -36542,7 +36578,41 @@
 </ct:contentTypeSchema>
 </file>
 
+<file path=customXml/item2.xml><?xml version="1.0" encoding="utf-8"?>
+<p:properties xmlns:p="http://schemas.microsoft.com/office/2006/metadata/properties" xmlns:xsi="http://www.w3.org/2001/XMLSchema-instance" xmlns:pc="http://schemas.microsoft.com/office/infopath/2007/PartnerControls">
+  <documentManagement/>
+</p:properties>
+</file>
+
+<file path=customXml/item3.xml><?xml version="1.0" encoding="utf-8"?>
+<?mso-contentType ?>
+<FormTemplates xmlns="http://schemas.microsoft.com/sharepoint/v3/contenttype/forms">
+  <Display>DocumentLibraryForm</Display>
+  <Edit>DocumentLibraryForm</Edit>
+  <New>DocumentLibraryForm</New>
+</FormTemplates>
+</file>
+
 <file path=customXml/itemProps1.xml><?xml version="1.0" encoding="utf-8"?>
+<ds:datastoreItem xmlns:ds="http://schemas.openxmlformats.org/officeDocument/2006/customXml" ds:itemID="{D95D00C5-A255-4B17-B283-B46EAB3061C5}">
+  <ds:schemaRefs>
+    <ds:schemaRef ds:uri="http://schemas.microsoft.com/office/2006/metadata/contentType"/>
+    <ds:schemaRef ds:uri="http://schemas.microsoft.com/office/2006/metadata/properties/metaAttributes"/>
+    <ds:schemaRef ds:uri="http://www.w3.org/2001/XMLSchema"/>
+    <ds:schemaRef ds:uri="http://schemas.microsoft.com/office/2006/metadata/properties"/>
+    <ds:schemaRef ds:uri="e60f335d-e4bd-4666-890a-892f5e8cff2d"/>
+    <ds:schemaRef ds:uri="d5f8be41-0169-49b5-b686-d4287d5aac73"/>
+    <ds:schemaRef ds:uri="http://schemas.microsoft.com/office/2006/documentManagement/types"/>
+    <ds:schemaRef ds:uri="http://schemas.microsoft.com/office/infopath/2007/PartnerControls"/>
+    <ds:schemaRef ds:uri="http://schemas.openxmlformats.org/package/2006/metadata/core-properties"/>
+    <ds:schemaRef ds:uri="http://purl.org/dc/elements/1.1/"/>
+    <ds:schemaRef ds:uri="http://purl.org/dc/terms/"/>
+    <ds:schemaRef ds:uri="http://schemas.microsoft.com/internal/obd"/>
+  </ds:schemaRefs>
+</ds:datastoreItem>
+</file>
+
+<file path=customXml/itemProps2.xml><?xml version="1.0" encoding="utf-8"?>
 <ds:datastoreItem xmlns:ds="http://schemas.openxmlformats.org/officeDocument/2006/customXml" ds:itemID="{7E178D45-7F39-4ADD-A744-70639435E68C}">
   <ds:schemaRefs>
     <ds:schemaRef ds:uri="http://purl.org/dc/elements/1.1/"/>
@@ -36559,29 +36629,10 @@
 </ds:datastoreItem>
 </file>
 
-<file path=customXml/itemProps2.xml><?xml version="1.0" encoding="utf-8"?>
+<file path=customXml/itemProps3.xml><?xml version="1.0" encoding="utf-8"?>
 <ds:datastoreItem xmlns:ds="http://schemas.openxmlformats.org/officeDocument/2006/customXml" ds:itemID="{2EBDE53D-6E78-4709-828D-56940832F243}">
   <ds:schemaRefs>
     <ds:schemaRef ds:uri="http://schemas.microsoft.com/sharepoint/v3/contenttype/forms"/>
   </ds:schemaRefs>
 </ds:datastoreItem>
-</file>
-
-<file path=customXml/itemProps3.xml><?xml version="1.0" encoding="utf-8"?>
-<ds:datastoreItem xmlns:ds="http://schemas.openxmlformats.org/officeDocument/2006/customXml" ds:itemID="{D95D00C5-A255-4B17-B283-B46EAB3061C5}">
-  <ds:schemaRefs>
-    <ds:schemaRef ds:uri="http://schemas.microsoft.com/office/2006/metadata/contentType"/>
-    <ds:schemaRef ds:uri="http://schemas.microsoft.com/office/2006/metadata/properties/metaAttributes"/>
-    <ds:schemaRef ds:uri="http://www.w3.org/2001/XMLSchema"/>
-    <ds:schemaRef ds:uri="http://schemas.microsoft.com/office/2006/metadata/properties"/>
-    <ds:schemaRef ds:uri="e60f335d-e4bd-4666-890a-892f5e8cff2d"/>
-    <ds:schemaRef ds:uri="d5f8be41-0169-49b5-b686-d4287d5aac73"/>
-    <ds:schemaRef ds:uri="http://schemas.microsoft.com/office/2006/documentManagement/types"/>
-    <ds:schemaRef ds:uri="http://schemas.microsoft.com/office/infopath/2007/PartnerControls"/>
-    <ds:schemaRef ds:uri="http://schemas.openxmlformats.org/package/2006/metadata/core-properties"/>
-    <ds:schemaRef ds:uri="http://purl.org/dc/elements/1.1/"/>
-    <ds:schemaRef ds:uri="http://purl.org/dc/terms/"/>
-    <ds:schemaRef ds:uri="http://schemas.microsoft.com/internal/obd"/>
-  </ds:schemaRefs>
-</ds:datastoreItem>
 </file>
</xml_diff>